<commit_message>
po meet 5 edit
</commit_message>
<xml_diff>
--- a/documentatie/po presentaties/PO meet 5.pptx
+++ b/documentatie/po presentaties/PO meet 5.pptx
@@ -5,10 +5,10 @@
     <p:sldMasterId id="2147483672" r:id="rId1"/>
   </p:sldMasterIdLst>
   <p:notesMasterIdLst>
-    <p:notesMasterId r:id="rId9"/>
+    <p:notesMasterId r:id="rId11"/>
   </p:notesMasterIdLst>
   <p:handoutMasterIdLst>
-    <p:handoutMasterId r:id="rId10"/>
+    <p:handoutMasterId r:id="rId12"/>
   </p:handoutMasterIdLst>
   <p:sldIdLst>
     <p:sldId id="256" r:id="rId2"/>
@@ -16,8 +16,10 @@
     <p:sldId id="275" r:id="rId4"/>
     <p:sldId id="280" r:id="rId5"/>
     <p:sldId id="274" r:id="rId6"/>
-    <p:sldId id="278" r:id="rId7"/>
-    <p:sldId id="279" r:id="rId8"/>
+    <p:sldId id="281" r:id="rId7"/>
+    <p:sldId id="283" r:id="rId8"/>
+    <p:sldId id="278" r:id="rId9"/>
+    <p:sldId id="279" r:id="rId10"/>
   </p:sldIdLst>
   <p:sldSz cx="12192000" cy="6858000"/>
   <p:notesSz cx="6858000" cy="9144000"/>
@@ -721,7 +723,10 @@
           <a:lstStyle/>
           <a:p>
             <a:pPr rtl="0"/>
-            <a:endParaRPr lang="nl-NL"/>
+            <a:r>
+              <a:rPr lang="nl-NL" dirty="0"/>
+              <a:t>merel</a:t>
+            </a:r>
           </a:p>
         </p:txBody>
       </p:sp>
@@ -807,7 +812,11 @@
           <a:lstStyle/>
           <a:p>
             <a:pPr rtl="0"/>
-            <a:endParaRPr lang="nl-NL"/>
+            <a:r>
+              <a:rPr lang="nl-NL" dirty="0" err="1"/>
+              <a:t>hannah</a:t>
+            </a:r>
+            <a:endParaRPr lang="nl-NL" dirty="0"/>
           </a:p>
         </p:txBody>
       </p:sp>
@@ -893,7 +902,11 @@
           <a:lstStyle/>
           <a:p>
             <a:pPr rtl="0"/>
-            <a:endParaRPr lang="nl-NL"/>
+            <a:r>
+              <a:rPr lang="nl-NL" dirty="0" err="1"/>
+              <a:t>fabio</a:t>
+            </a:r>
+            <a:endParaRPr lang="nl-NL" dirty="0"/>
           </a:p>
         </p:txBody>
       </p:sp>
@@ -979,7 +992,11 @@
           <a:lstStyle/>
           <a:p>
             <a:pPr rtl="0"/>
-            <a:endParaRPr lang="nl-NL"/>
+            <a:r>
+              <a:rPr lang="nl-NL" dirty="0" err="1"/>
+              <a:t>hannah</a:t>
+            </a:r>
+            <a:endParaRPr lang="nl-NL" dirty="0"/>
           </a:p>
         </p:txBody>
       </p:sp>
@@ -1065,7 +1082,11 @@
           <a:lstStyle/>
           <a:p>
             <a:pPr rtl="0"/>
-            <a:endParaRPr lang="nl-NL"/>
+            <a:r>
+              <a:rPr lang="nl-NL" dirty="0" err="1"/>
+              <a:t>fabio</a:t>
+            </a:r>
+            <a:endParaRPr lang="nl-NL" dirty="0"/>
           </a:p>
         </p:txBody>
       </p:sp>
@@ -1151,7 +1172,11 @@
           <a:lstStyle/>
           <a:p>
             <a:pPr rtl="0"/>
-            <a:endParaRPr lang="nl-NL"/>
+            <a:r>
+              <a:rPr lang="nl-NL" dirty="0" err="1"/>
+              <a:t>corne</a:t>
+            </a:r>
+            <a:endParaRPr lang="nl-NL" dirty="0"/>
           </a:p>
         </p:txBody>
       </p:sp>
@@ -1182,7 +1207,7 @@
     </p:spTree>
     <p:extLst>
       <p:ext uri="{BB962C8B-B14F-4D97-AF65-F5344CB8AC3E}">
-        <p14:creationId xmlns:p14="http://schemas.microsoft.com/office/powerpoint/2010/main" val="3216733822"/>
+        <p14:creationId xmlns:p14="http://schemas.microsoft.com/office/powerpoint/2010/main" val="1402651240"/>
       </p:ext>
     </p:extLst>
   </p:cSld>
@@ -1237,7 +1262,11 @@
           <a:lstStyle/>
           <a:p>
             <a:pPr rtl="0"/>
-            <a:endParaRPr lang="nl-NL"/>
+            <a:r>
+              <a:rPr lang="nl-NL" dirty="0" err="1"/>
+              <a:t>fabio</a:t>
+            </a:r>
+            <a:endParaRPr lang="nl-NL" dirty="0"/>
           </a:p>
         </p:txBody>
       </p:sp>
@@ -1260,6 +1289,185 @@
             <a:fld id="{C6B3AB32-59DF-41F1-9618-EDFBF5049629}" type="slidenum">
               <a:rPr lang="nl-NL" smtClean="0"/>
               <a:t>7</a:t>
+            </a:fld>
+            <a:endParaRPr lang="nl-NL"/>
+          </a:p>
+        </p:txBody>
+      </p:sp>
+    </p:spTree>
+    <p:extLst>
+      <p:ext uri="{BB962C8B-B14F-4D97-AF65-F5344CB8AC3E}">
+        <p14:creationId xmlns:p14="http://schemas.microsoft.com/office/powerpoint/2010/main" val="3062667050"/>
+      </p:ext>
+    </p:extLst>
+  </p:cSld>
+  <p:clrMapOvr>
+    <a:masterClrMapping/>
+  </p:clrMapOvr>
+</p:notes>
+</file>
+
+<file path=ppt/notesSlides/notesSlide8.xml><?xml version="1.0" encoding="utf-8"?>
+<p:notes xmlns:a="http://schemas.openxmlformats.org/drawingml/2006/main" xmlns:r="http://schemas.openxmlformats.org/officeDocument/2006/relationships" xmlns:p="http://schemas.openxmlformats.org/presentationml/2006/main">
+  <p:cSld>
+    <p:spTree>
+      <p:nvGrpSpPr>
+        <p:cNvPr id="1" name=""/>
+        <p:cNvGrpSpPr/>
+        <p:nvPr/>
+      </p:nvGrpSpPr>
+      <p:grpSpPr>
+        <a:xfrm>
+          <a:off x="0" y="0"/>
+          <a:ext cx="0" cy="0"/>
+          <a:chOff x="0" y="0"/>
+          <a:chExt cx="0" cy="0"/>
+        </a:xfrm>
+      </p:grpSpPr>
+      <p:sp>
+        <p:nvSpPr>
+          <p:cNvPr id="2" name="Tijdelijke aanduiding voor dia-afbeelding 1"/>
+          <p:cNvSpPr>
+            <a:spLocks noGrp="1" noRot="1" noChangeAspect="1"/>
+          </p:cNvSpPr>
+          <p:nvPr>
+            <p:ph type="sldImg"/>
+          </p:nvPr>
+        </p:nvSpPr>
+        <p:spPr/>
+      </p:sp>
+      <p:sp>
+        <p:nvSpPr>
+          <p:cNvPr id="3" name="Tijdelijke aanduiding voor notities 2"/>
+          <p:cNvSpPr>
+            <a:spLocks noGrp="1"/>
+          </p:cNvSpPr>
+          <p:nvPr>
+            <p:ph type="body" idx="1"/>
+          </p:nvPr>
+        </p:nvSpPr>
+        <p:spPr/>
+        <p:txBody>
+          <a:bodyPr rtlCol="0"/>
+          <a:lstStyle/>
+          <a:p>
+            <a:pPr rtl="0"/>
+            <a:r>
+              <a:rPr lang="nl-NL" dirty="0"/>
+              <a:t>merel</a:t>
+            </a:r>
+          </a:p>
+        </p:txBody>
+      </p:sp>
+      <p:sp>
+        <p:nvSpPr>
+          <p:cNvPr id="4" name="Tijdelijke aanduiding voor dianummer 3"/>
+          <p:cNvSpPr>
+            <a:spLocks noGrp="1"/>
+          </p:cNvSpPr>
+          <p:nvPr>
+            <p:ph type="sldNum" sz="quarter" idx="5"/>
+          </p:nvPr>
+        </p:nvSpPr>
+        <p:spPr/>
+        <p:txBody>
+          <a:bodyPr rtlCol="0"/>
+          <a:lstStyle/>
+          <a:p>
+            <a:pPr rtl="0"/>
+            <a:fld id="{C6B3AB32-59DF-41F1-9618-EDFBF5049629}" type="slidenum">
+              <a:rPr lang="nl-NL" smtClean="0"/>
+              <a:t>8</a:t>
+            </a:fld>
+            <a:endParaRPr lang="nl-NL"/>
+          </a:p>
+        </p:txBody>
+      </p:sp>
+    </p:spTree>
+    <p:extLst>
+      <p:ext uri="{BB962C8B-B14F-4D97-AF65-F5344CB8AC3E}">
+        <p14:creationId xmlns:p14="http://schemas.microsoft.com/office/powerpoint/2010/main" val="3216733822"/>
+      </p:ext>
+    </p:extLst>
+  </p:cSld>
+  <p:clrMapOvr>
+    <a:masterClrMapping/>
+  </p:clrMapOvr>
+</p:notes>
+</file>
+
+<file path=ppt/notesSlides/notesSlide9.xml><?xml version="1.0" encoding="utf-8"?>
+<p:notes xmlns:a="http://schemas.openxmlformats.org/drawingml/2006/main" xmlns:r="http://schemas.openxmlformats.org/officeDocument/2006/relationships" xmlns:p="http://schemas.openxmlformats.org/presentationml/2006/main">
+  <p:cSld>
+    <p:spTree>
+      <p:nvGrpSpPr>
+        <p:cNvPr id="1" name=""/>
+        <p:cNvGrpSpPr/>
+        <p:nvPr/>
+      </p:nvGrpSpPr>
+      <p:grpSpPr>
+        <a:xfrm>
+          <a:off x="0" y="0"/>
+          <a:ext cx="0" cy="0"/>
+          <a:chOff x="0" y="0"/>
+          <a:chExt cx="0" cy="0"/>
+        </a:xfrm>
+      </p:grpSpPr>
+      <p:sp>
+        <p:nvSpPr>
+          <p:cNvPr id="2" name="Tijdelijke aanduiding voor dia-afbeelding 1"/>
+          <p:cNvSpPr>
+            <a:spLocks noGrp="1" noRot="1" noChangeAspect="1"/>
+          </p:cNvSpPr>
+          <p:nvPr>
+            <p:ph type="sldImg"/>
+          </p:nvPr>
+        </p:nvSpPr>
+        <p:spPr/>
+      </p:sp>
+      <p:sp>
+        <p:nvSpPr>
+          <p:cNvPr id="3" name="Tijdelijke aanduiding voor notities 2"/>
+          <p:cNvSpPr>
+            <a:spLocks noGrp="1"/>
+          </p:cNvSpPr>
+          <p:nvPr>
+            <p:ph type="body" idx="1"/>
+          </p:nvPr>
+        </p:nvSpPr>
+        <p:spPr/>
+        <p:txBody>
+          <a:bodyPr rtlCol="0"/>
+          <a:lstStyle/>
+          <a:p>
+            <a:pPr rtl="0"/>
+            <a:r>
+              <a:rPr lang="nl-NL" dirty="0" err="1"/>
+              <a:t>Corne</a:t>
+            </a:r>
+            <a:endParaRPr lang="nl-NL" dirty="0"/>
+          </a:p>
+        </p:txBody>
+      </p:sp>
+      <p:sp>
+        <p:nvSpPr>
+          <p:cNvPr id="4" name="Tijdelijke aanduiding voor dianummer 3"/>
+          <p:cNvSpPr>
+            <a:spLocks noGrp="1"/>
+          </p:cNvSpPr>
+          <p:nvPr>
+            <p:ph type="sldNum" sz="quarter" idx="5"/>
+          </p:nvPr>
+        </p:nvSpPr>
+        <p:spPr/>
+        <p:txBody>
+          <a:bodyPr rtlCol="0"/>
+          <a:lstStyle/>
+          <a:p>
+            <a:pPr rtl="0"/>
+            <a:fld id="{C6B3AB32-59DF-41F1-9618-EDFBF5049629}" type="slidenum">
+              <a:rPr lang="nl-NL" smtClean="0"/>
+              <a:t>9</a:t>
             </a:fld>
             <a:endParaRPr lang="nl-NL"/>
           </a:p>
@@ -5766,7 +5974,7 @@
         </p:spPr>
         <p:txBody>
           <a:bodyPr>
-            <a:normAutofit/>
+            <a:noAutofit/>
           </a:bodyPr>
           <a:lstStyle/>
           <a:p>
@@ -5873,6 +6081,126 @@
                 <a:cs typeface="Arial" panose="020B0604020202020204" pitchFamily="34" charset="0"/>
               </a:rPr>
               <a:t>Code schrijven om de pinautomaat met de server te verbinden.</a:t>
+            </a:r>
+          </a:p>
+          <a:p>
+            <a:pPr>
+              <a:buFont typeface="Wingdings" panose="05000000000000000000" pitchFamily="2" charset="2"/>
+              <a:buChar char="§"/>
+            </a:pPr>
+            <a:r>
+              <a:rPr lang="nl-NL" sz="1600" dirty="0">
+                <a:solidFill>
+                  <a:schemeClr val="tx1"/>
+                </a:solidFill>
+                <a:latin typeface="Aptos" panose="020B0004020202020204" pitchFamily="34" charset="0"/>
+              </a:rPr>
+              <a:t>US 11 afronden – </a:t>
+            </a:r>
+            <a:r>
+              <a:rPr lang="nl-NL" sz="1600" b="0" i="0" dirty="0">
+                <a:solidFill>
+                  <a:schemeClr val="tx1"/>
+                </a:solidFill>
+                <a:effectLst/>
+                <a:latin typeface="Aptos" panose="020B0004020202020204" pitchFamily="34" charset="0"/>
+              </a:rPr>
+              <a:t>Als gebruiker wil ik dat er een numeriek toetsenbord is zodat ik mijn pincode en een bedrag naar keuze kan invoeren.</a:t>
+            </a:r>
+          </a:p>
+          <a:p>
+            <a:pPr lvl="1">
+              <a:buFont typeface="Wingdings" panose="05000000000000000000" pitchFamily="2" charset="2"/>
+              <a:buChar char="Ø"/>
+            </a:pPr>
+            <a:r>
+              <a:rPr lang="nl-NL" dirty="0">
+                <a:solidFill>
+                  <a:schemeClr val="tx1"/>
+                </a:solidFill>
+                <a:latin typeface="Aptos" panose="020B0004020202020204" pitchFamily="34" charset="0"/>
+              </a:rPr>
+              <a:t>11.2 </a:t>
+            </a:r>
+            <a:r>
+              <a:rPr lang="nl-NL" dirty="0">
+                <a:solidFill>
+                  <a:schemeClr val="tx1"/>
+                </a:solidFill>
+                <a:effectLst/>
+                <a:latin typeface="Aptos" panose="020B0004020202020204" pitchFamily="34" charset="0"/>
+                <a:ea typeface="Aptos" panose="020B0004020202020204" pitchFamily="34" charset="0"/>
+                <a:cs typeface="Arial" panose="020B0604020202020204" pitchFamily="34" charset="0"/>
+              </a:rPr>
+              <a:t>Het numeriek toetsenbord realiseren.</a:t>
+            </a:r>
+            <a:endParaRPr lang="nl-NL" dirty="0">
+              <a:solidFill>
+                <a:schemeClr val="tx1"/>
+              </a:solidFill>
+              <a:latin typeface="Aptos" panose="020B0004020202020204" pitchFamily="34" charset="0"/>
+              <a:ea typeface="Aptos" panose="020B0004020202020204" pitchFamily="34" charset="0"/>
+              <a:cs typeface="Arial" panose="020B0604020202020204" pitchFamily="34" charset="0"/>
+            </a:endParaRPr>
+          </a:p>
+          <a:p>
+            <a:pPr lvl="1">
+              <a:buFont typeface="Wingdings" panose="05000000000000000000" pitchFamily="2" charset="2"/>
+              <a:buChar char="Ø"/>
+            </a:pPr>
+            <a:r>
+              <a:rPr lang="nl-NL" dirty="0">
+                <a:effectLst/>
+                <a:latin typeface="Aptos" panose="020B0004020202020204" pitchFamily="34" charset="0"/>
+                <a:ea typeface="Aptos" panose="020B0004020202020204" pitchFamily="34" charset="0"/>
+                <a:cs typeface="Arial" panose="020B0604020202020204" pitchFamily="34" charset="0"/>
+              </a:rPr>
+              <a:t>11.3 Code schrijven om het numeriek toetsenbord te laten werken.</a:t>
+            </a:r>
+          </a:p>
+          <a:p>
+            <a:r>
+              <a:rPr lang="nl-NL" sz="1600" dirty="0">
+                <a:solidFill>
+                  <a:schemeClr val="tx1"/>
+                </a:solidFill>
+                <a:latin typeface="Aptos" panose="020B0004020202020204" pitchFamily="34" charset="0"/>
+                <a:ea typeface="Aptos" panose="020B0004020202020204" pitchFamily="34" charset="0"/>
+                <a:cs typeface="Arial" panose="020B0604020202020204" pitchFamily="34" charset="0"/>
+              </a:rPr>
+              <a:t>US 3 - </a:t>
+            </a:r>
+            <a:r>
+              <a:rPr lang="nl-NL" sz="1600" dirty="0">
+                <a:effectLst/>
+                <a:latin typeface="Aptos" panose="020B0004020202020204" pitchFamily="34" charset="0"/>
+                <a:ea typeface="Aptos" panose="020B0004020202020204" pitchFamily="34" charset="0"/>
+                <a:cs typeface="Arial" panose="020B0604020202020204" pitchFamily="34" charset="0"/>
+              </a:rPr>
+              <a:t>Als bankeigenaar wil ik dat de pinautomaat in een algemene omgeving bruikbaar is, zodat deze op elke plek, die ik wil, ingezet kan worden.</a:t>
+            </a:r>
+            <a:endParaRPr lang="nl-NL" sz="1600" dirty="0">
+              <a:solidFill>
+                <a:schemeClr val="tx1"/>
+              </a:solidFill>
+              <a:latin typeface="Aptos" panose="020B0004020202020204" pitchFamily="34" charset="0"/>
+              <a:ea typeface="Aptos" panose="020B0004020202020204" pitchFamily="34" charset="0"/>
+              <a:cs typeface="Arial" panose="020B0604020202020204" pitchFamily="34" charset="0"/>
+            </a:endParaRPr>
+          </a:p>
+          <a:p>
+            <a:pPr lvl="1">
+              <a:buFont typeface="Wingdings" panose="05000000000000000000" pitchFamily="2" charset="2"/>
+              <a:buChar char="Ø"/>
+            </a:pPr>
+            <a:r>
+              <a:rPr lang="nl-NL" dirty="0">
+                <a:effectLst/>
+                <a:latin typeface="Aptos" panose="020B0004020202020204" pitchFamily="34" charset="0"/>
+                <a:ea typeface="Aptos" panose="020B0004020202020204" pitchFamily="34" charset="0"/>
+                <a:cs typeface="Arial" panose="020B0604020202020204" pitchFamily="34" charset="0"/>
+              </a:rPr>
+              <a:t>3.2 Het prototype realiseren.</a:t>
             </a:r>
           </a:p>
         </p:txBody>
@@ -5988,12 +6316,7 @@
               <a:buNone/>
             </a:pPr>
             <a:r>
-              <a:rPr lang="nl-NL" sz="1700" dirty="0">
-                <a:solidFill>
-                  <a:schemeClr val="tx1"/>
-                </a:solidFill>
-                <a:latin typeface="Aptos" panose="020B0004020202020204" pitchFamily="34" charset="0"/>
-              </a:rPr>
+              <a:rPr lang="nl-NL"/>
               <a:t>US 13: </a:t>
             </a:r>
           </a:p>
@@ -6002,22 +6325,13 @@
               <a:buNone/>
             </a:pPr>
             <a:r>
-              <a:rPr lang="nl-NL" sz="1700" b="0" i="0" dirty="0">
-                <a:solidFill>
-                  <a:schemeClr val="tx1"/>
-                </a:solidFill>
+              <a:rPr lang="nl-NL" b="0" i="0">
                 <a:effectLst/>
-                <a:latin typeface="Aptos" panose="020B0004020202020204" pitchFamily="34" charset="0"/>
               </a:rPr>
               <a:t>Als gebruiker wil ik graag verschillende biljetten kunnen pinnen zodat ik makkelijker kan betalen.</a:t>
             </a:r>
             <a:r>
-              <a:rPr lang="nl-NL" sz="1700" dirty="0">
-                <a:solidFill>
-                  <a:schemeClr val="tx1"/>
-                </a:solidFill>
-                <a:latin typeface="Aptos" panose="020B0004020202020204" pitchFamily="34" charset="0"/>
-              </a:rPr>
+              <a:rPr lang="nl-NL"/>
               <a:t> </a:t>
             </a:r>
           </a:p>
@@ -6026,10 +6340,7 @@
               <a:buNone/>
             </a:pPr>
             <a:r>
-              <a:rPr lang="nl-NL" dirty="0">
-                <a:latin typeface="Aptos" panose="020B0004020202020204" pitchFamily="34" charset="0"/>
-                <a:cs typeface="Arial" panose="020B0604020202020204" pitchFamily="34" charset="0"/>
-              </a:rPr>
+              <a:rPr lang="nl-NL"/>
               <a:t>Taken:</a:t>
             </a:r>
           </a:p>
@@ -6038,12 +6349,8 @@
               <a:buNone/>
             </a:pPr>
             <a:r>
-              <a:rPr lang="nl-NL" b="0" i="0" dirty="0">
-                <a:solidFill>
-                  <a:schemeClr val="tx1"/>
-                </a:solidFill>
+              <a:rPr lang="nl-NL" b="0" i="0">
                 <a:effectLst/>
-                <a:latin typeface="Aptos" panose="020B0004020202020204" pitchFamily="34" charset="0"/>
               </a:rPr>
               <a:t>13.2 Uitwerpmechanisme voor de biljetten realiseren.</a:t>
             </a:r>
@@ -6052,66 +6359,56 @@
             <a:pPr marL="0" indent="0">
               <a:buNone/>
             </a:pPr>
-            <a:endParaRPr lang="nl-NL" dirty="0">
-              <a:solidFill>
-                <a:schemeClr val="tx1"/>
-              </a:solidFill>
-              <a:latin typeface="Aptos" panose="020B0004020202020204" pitchFamily="34" charset="0"/>
-            </a:endParaRPr>
-          </a:p>
-          <a:p>
-            <a:r>
-              <a:rPr lang="nl-NL" dirty="0">
-                <a:solidFill>
-                  <a:schemeClr val="tx1"/>
-                </a:solidFill>
-                <a:latin typeface="Aptos" panose="020B0004020202020204" pitchFamily="34" charset="0"/>
-              </a:rPr>
-              <a:t>Product laten zien</a:t>
-            </a:r>
-            <a:endParaRPr lang="nl-NL" sz="1800" dirty="0">
-              <a:solidFill>
-                <a:schemeClr val="tx1"/>
-              </a:solidFill>
-              <a:latin typeface="Aptos" panose="020B0004020202020204" pitchFamily="34" charset="0"/>
-            </a:endParaRPr>
+            <a:endParaRPr lang="nl-NL"/>
           </a:p>
         </p:txBody>
       </p:sp>
       <p:pic>
         <p:nvPicPr>
-          <p:cNvPr id="7" name="Afbeelding 6" descr="Digitale verbindingen">
+          <p:cNvPr id="1028" name="Picture 4" descr="A blue and black drawing of a cart&#10;&#10;AI-generated content may be incorrect.">
             <a:extLst>
               <a:ext uri="{FF2B5EF4-FFF2-40B4-BE49-F238E27FC236}">
-                <a16:creationId xmlns:a16="http://schemas.microsoft.com/office/drawing/2014/main" id="{3840F91C-EDD0-4D4E-A4AB-E6C77856C88C}"/>
+                <a16:creationId xmlns:a16="http://schemas.microsoft.com/office/drawing/2014/main" id="{6F7A895F-992C-0BE6-9689-1C7F26859A9D}"/>
               </a:ext>
             </a:extLst>
           </p:cNvPr>
           <p:cNvPicPr>
-            <a:picLocks noChangeAspect="1"/>
+            <a:picLocks noChangeAspect="1" noChangeArrowheads="1"/>
           </p:cNvPicPr>
           <p:nvPr/>
         </p:nvPicPr>
-        <p:blipFill rotWithShape="1">
-          <a:blip r:embed="rId3" cstate="screen">
+        <p:blipFill>
+          <a:blip r:embed="rId3">
             <a:extLst>
               <a:ext uri="{28A0092B-C50C-407E-A947-70E740481C1C}">
-                <a14:useLocalDpi xmlns:a14="http://schemas.microsoft.com/office/drawing/2010/main"/>
+                <a14:useLocalDpi xmlns:a14="http://schemas.microsoft.com/office/drawing/2010/main" val="0"/>
               </a:ext>
             </a:extLst>
           </a:blip>
-          <a:srcRect l="13265" t="9091" r="3502" b="-1"/>
-          <a:stretch/>
+          <a:stretch>
+            <a:fillRect/>
+          </a:stretch>
         </p:blipFill>
-        <p:spPr>
-          <a:xfrm>
-            <a:off x="6188417" y="2519476"/>
-            <a:ext cx="5422392" cy="3050100"/>
+        <p:spPr bwMode="auto">
+          <a:xfrm>
+            <a:off x="6188417" y="2546591"/>
+            <a:ext cx="5422392" cy="2995871"/>
           </a:xfrm>
           <a:prstGeom prst="rect">
             <a:avLst/>
           </a:prstGeom>
-          <a:noFill/>
+          <a:solidFill>
+            <a:srgbClr val="FFFFFF"/>
+          </a:solidFill>
+          <a:extLst>
+            <a:ext uri="{909E8E84-426E-40DD-AFC4-6F175D3DCCD1}">
+              <a14:hiddenFill xmlns:a14="http://schemas.microsoft.com/office/drawing/2010/main">
+                <a:solidFill>
+                  <a:srgbClr val="FFFFFF"/>
+                </a:solidFill>
+              </a14:hiddenFill>
+            </a:ext>
+          </a:extLst>
         </p:spPr>
       </p:pic>
     </p:spTree>
@@ -6233,8 +6530,23 @@
                 </a:solidFill>
                 <a:latin typeface="Aptos" panose="020B0004020202020204" pitchFamily="34" charset="0"/>
               </a:rPr>
-              <a:t>Beveiliging rapport geschreven</a:t>
-            </a:r>
+              <a:t>Beveiliging rapport </a:t>
+            </a:r>
+            <a:r>
+              <a:rPr lang="nl-NL" sz="1800" dirty="0" err="1">
+                <a:solidFill>
+                  <a:schemeClr val="tx1"/>
+                </a:solidFill>
+                <a:latin typeface="Aptos" panose="020B0004020202020204" pitchFamily="34" charset="0"/>
+              </a:rPr>
+              <a:t>aangewerkt</a:t>
+            </a:r>
+            <a:endParaRPr lang="nl-NL" sz="1800" dirty="0">
+              <a:solidFill>
+                <a:schemeClr val="tx1"/>
+              </a:solidFill>
+              <a:latin typeface="Aptos" panose="020B0004020202020204" pitchFamily="34" charset="0"/>
+            </a:endParaRPr>
           </a:p>
           <a:p>
             <a:pPr marL="0" indent="0">
@@ -6453,6 +6765,20 @@
               <a:t>2.3 Code schrijven om de pinautomaat met de server te verbinden.</a:t>
             </a:r>
           </a:p>
+          <a:p>
+            <a:pPr marL="0" indent="0">
+              <a:buNone/>
+            </a:pPr>
+            <a:r>
+              <a:rPr lang="nl-NL" dirty="0">
+                <a:solidFill>
+                  <a:schemeClr val="tx1"/>
+                </a:solidFill>
+                <a:latin typeface="Aptos" panose="020B0004020202020204" pitchFamily="34" charset="0"/>
+              </a:rPr>
+              <a:t>Communicatie probleem, wisseling systeem</a:t>
+            </a:r>
+          </a:p>
         </p:txBody>
       </p:sp>
       <p:pic>
@@ -6551,9 +6877,10 @@
           <a:p>
             <a:pPr rtl="0"/>
             <a:r>
-              <a:rPr lang="nl-NL" dirty="0"/>
-              <a:t>retrospectieve</a:t>
-            </a:r>
+              <a:rPr lang="nl-NL" dirty="0" err="1"/>
+              <a:t>Keypad</a:t>
+            </a:r>
+            <a:endParaRPr lang="nl-NL" dirty="0"/>
           </a:p>
         </p:txBody>
       </p:sp>
@@ -6589,42 +6916,104 @@
               <a:buNone/>
             </a:pPr>
             <a:r>
-              <a:rPr lang="nl-NL" dirty="0"/>
-              <a:t>Samenwerking:</a:t>
-            </a:r>
-          </a:p>
-          <a:p>
-            <a:r>
-              <a:rPr lang="nl-NL" dirty="0"/>
-              <a:t>Ging goed</a:t>
+              <a:rPr lang="nl-NL" sz="1700" dirty="0">
+                <a:solidFill>
+                  <a:schemeClr val="tx1"/>
+                </a:solidFill>
+                <a:latin typeface="Aptos" panose="020B0004020202020204" pitchFamily="34" charset="0"/>
+              </a:rPr>
+              <a:t>US 11:</a:t>
             </a:r>
           </a:p>
           <a:p>
             <a:pPr marL="0" indent="0">
               <a:buNone/>
             </a:pPr>
-            <a:endParaRPr lang="nl-NL" dirty="0"/>
+            <a:r>
+              <a:rPr lang="nl-NL" sz="1700" b="0" i="0" dirty="0">
+                <a:solidFill>
+                  <a:schemeClr val="tx1"/>
+                </a:solidFill>
+                <a:effectLst/>
+                <a:latin typeface="Aptos" panose="020B0004020202020204" pitchFamily="34" charset="0"/>
+              </a:rPr>
+              <a:t>Als gebruiker wil ik dat er een numeriek toetsenbord is zodat ik mijn pincode en een bedrag naar keuze kan invoeren.</a:t>
+            </a:r>
           </a:p>
           <a:p>
             <a:pPr marL="0" indent="0">
               <a:buNone/>
             </a:pPr>
             <a:r>
-              <a:rPr lang="nl-NL" dirty="0"/>
-              <a:t>Project werk:</a:t>
-            </a:r>
-          </a:p>
-          <a:p>
-            <a:r>
-              <a:rPr lang="nl-NL" dirty="0"/>
-              <a:t>Werken aan project ging goed</a:t>
-            </a:r>
-          </a:p>
-          <a:p>
-            <a:r>
-              <a:rPr lang="nl-NL" dirty="0"/>
-              <a:t>Stress vanwege aankomende deadline</a:t>
-            </a:r>
+              <a:rPr lang="nl-NL" sz="1700" dirty="0">
+                <a:solidFill>
+                  <a:schemeClr val="tx1"/>
+                </a:solidFill>
+                <a:latin typeface="Aptos" panose="020B0004020202020204" pitchFamily="34" charset="0"/>
+              </a:rPr>
+              <a:t>Taken: </a:t>
+            </a:r>
+          </a:p>
+          <a:p>
+            <a:pPr marL="0" indent="0">
+              <a:buNone/>
+            </a:pPr>
+            <a:r>
+              <a:rPr lang="nl-NL" sz="1700" dirty="0">
+                <a:solidFill>
+                  <a:schemeClr val="tx1"/>
+                </a:solidFill>
+                <a:latin typeface="Aptos" panose="020B0004020202020204" pitchFamily="34" charset="0"/>
+              </a:rPr>
+              <a:t>11.2 </a:t>
+            </a:r>
+            <a:r>
+              <a:rPr lang="nl-NL" sz="1700" dirty="0">
+                <a:solidFill>
+                  <a:schemeClr val="tx1"/>
+                </a:solidFill>
+                <a:effectLst/>
+                <a:latin typeface="Aptos" panose="020B0004020202020204" pitchFamily="34" charset="0"/>
+                <a:ea typeface="Aptos" panose="020B0004020202020204" pitchFamily="34" charset="0"/>
+                <a:cs typeface="Arial" panose="020B0604020202020204" pitchFamily="34" charset="0"/>
+              </a:rPr>
+              <a:t>Het numeriek toetsenbord realiseren.</a:t>
+            </a:r>
+            <a:endParaRPr lang="nl-NL" sz="1700" dirty="0">
+              <a:solidFill>
+                <a:schemeClr val="tx1"/>
+              </a:solidFill>
+              <a:latin typeface="Aptos" panose="020B0004020202020204" pitchFamily="34" charset="0"/>
+              <a:ea typeface="Aptos" panose="020B0004020202020204" pitchFamily="34" charset="0"/>
+              <a:cs typeface="Arial" panose="020B0604020202020204" pitchFamily="34" charset="0"/>
+            </a:endParaRPr>
+          </a:p>
+          <a:p>
+            <a:pPr marL="0" indent="0">
+              <a:buNone/>
+            </a:pPr>
+            <a:r>
+              <a:rPr lang="nl-NL" sz="1800" dirty="0">
+                <a:effectLst/>
+                <a:latin typeface="Aptos" panose="020B0004020202020204" pitchFamily="34" charset="0"/>
+                <a:ea typeface="Aptos" panose="020B0004020202020204" pitchFamily="34" charset="0"/>
+                <a:cs typeface="Arial" panose="020B0604020202020204" pitchFamily="34" charset="0"/>
+              </a:rPr>
+              <a:t>11.3 Code schrijven om het numeriek toetsenbord te laten werken.</a:t>
+            </a:r>
+          </a:p>
+          <a:p>
+            <a:pPr marL="0" indent="0">
+              <a:buNone/>
+            </a:pPr>
+            <a:endParaRPr lang="nl-NL" sz="1700" dirty="0">
+              <a:solidFill>
+                <a:schemeClr val="tx1"/>
+              </a:solidFill>
+              <a:latin typeface="Aptos" panose="020B0004020202020204" pitchFamily="34" charset="0"/>
+              <a:ea typeface="Aptos" panose="020B0004020202020204" pitchFamily="34" charset="0"/>
+              <a:cs typeface="Arial" panose="020B0604020202020204" pitchFamily="34" charset="0"/>
+            </a:endParaRPr>
           </a:p>
         </p:txBody>
       </p:sp>
@@ -6667,6 +7056,408 @@
     </p:spTree>
     <p:extLst>
       <p:ext uri="{BB962C8B-B14F-4D97-AF65-F5344CB8AC3E}">
+        <p14:creationId xmlns:p14="http://schemas.microsoft.com/office/powerpoint/2010/main" val="1118675644"/>
+      </p:ext>
+    </p:extLst>
+  </p:cSld>
+  <p:clrMapOvr>
+    <a:masterClrMapping/>
+  </p:clrMapOvr>
+</p:sld>
+</file>
+
+<file path=ppt/slides/slide7.xml><?xml version="1.0" encoding="utf-8"?>
+<p:sld xmlns:a="http://schemas.openxmlformats.org/drawingml/2006/main" xmlns:r="http://schemas.openxmlformats.org/officeDocument/2006/relationships" xmlns:p="http://schemas.openxmlformats.org/presentationml/2006/main">
+  <p:cSld>
+    <p:spTree>
+      <p:nvGrpSpPr>
+        <p:cNvPr id="1" name=""/>
+        <p:cNvGrpSpPr/>
+        <p:nvPr/>
+      </p:nvGrpSpPr>
+      <p:grpSpPr>
+        <a:xfrm>
+          <a:off x="0" y="0"/>
+          <a:ext cx="0" cy="0"/>
+          <a:chOff x="0" y="0"/>
+          <a:chExt cx="0" cy="0"/>
+        </a:xfrm>
+      </p:grpSpPr>
+      <p:sp>
+        <p:nvSpPr>
+          <p:cNvPr id="2" name="Titel 1">
+            <a:extLst>
+              <a:ext uri="{FF2B5EF4-FFF2-40B4-BE49-F238E27FC236}">
+                <a16:creationId xmlns:a16="http://schemas.microsoft.com/office/drawing/2014/main" id="{C02C5318-1A1E-49D0-B2E2-A4B0FA9E8A40}"/>
+              </a:ext>
+            </a:extLst>
+          </p:cNvPr>
+          <p:cNvSpPr>
+            <a:spLocks noGrp="1"/>
+          </p:cNvSpPr>
+          <p:nvPr>
+            <p:ph type="title"/>
+          </p:nvPr>
+        </p:nvSpPr>
+        <p:spPr>
+          <a:xfrm>
+            <a:off x="581193" y="729658"/>
+            <a:ext cx="11029616" cy="988332"/>
+          </a:xfrm>
+        </p:spPr>
+        <p:txBody>
+          <a:bodyPr rtlCol="0" anchor="b">
+            <a:normAutofit/>
+          </a:bodyPr>
+          <a:lstStyle/>
+          <a:p>
+            <a:pPr rtl="0"/>
+            <a:r>
+              <a:rPr lang="nl-NL" dirty="0"/>
+              <a:t>pinautomaat</a:t>
+            </a:r>
+          </a:p>
+        </p:txBody>
+      </p:sp>
+      <p:sp>
+        <p:nvSpPr>
+          <p:cNvPr id="3" name="Subtitel 2">
+            <a:extLst>
+              <a:ext uri="{FF2B5EF4-FFF2-40B4-BE49-F238E27FC236}">
+                <a16:creationId xmlns:a16="http://schemas.microsoft.com/office/drawing/2014/main" id="{48B6CF59-4E5B-494D-A2F7-97ADD01E6497}"/>
+              </a:ext>
+            </a:extLst>
+          </p:cNvPr>
+          <p:cNvSpPr>
+            <a:spLocks noGrp="1"/>
+          </p:cNvSpPr>
+          <p:nvPr>
+            <p:ph sz="half" idx="1"/>
+          </p:nvPr>
+        </p:nvSpPr>
+        <p:spPr>
+          <a:xfrm>
+            <a:off x="581193" y="2228003"/>
+            <a:ext cx="5422390" cy="3633047"/>
+          </a:xfrm>
+        </p:spPr>
+        <p:txBody>
+          <a:bodyPr rtlCol="0" anchor="ctr">
+            <a:normAutofit/>
+          </a:bodyPr>
+          <a:lstStyle/>
+          <a:p>
+            <a:pPr marL="0" indent="0">
+              <a:buNone/>
+            </a:pPr>
+            <a:r>
+              <a:rPr lang="nl-NL" sz="1700" dirty="0">
+                <a:solidFill>
+                  <a:schemeClr val="tx1"/>
+                </a:solidFill>
+                <a:latin typeface="Aptos" panose="020B0004020202020204" pitchFamily="34" charset="0"/>
+                <a:ea typeface="Aptos" panose="020B0004020202020204" pitchFamily="34" charset="0"/>
+                <a:cs typeface="Arial" panose="020B0604020202020204" pitchFamily="34" charset="0"/>
+              </a:rPr>
+              <a:t>US 3:</a:t>
+            </a:r>
+          </a:p>
+          <a:p>
+            <a:pPr marL="0" indent="0">
+              <a:buNone/>
+            </a:pPr>
+            <a:r>
+              <a:rPr lang="nl-NL" sz="1700" dirty="0">
+                <a:solidFill>
+                  <a:schemeClr val="tx1"/>
+                </a:solidFill>
+                <a:latin typeface="Aptos" panose="020B0004020202020204" pitchFamily="34" charset="0"/>
+                <a:ea typeface="Aptos" panose="020B0004020202020204" pitchFamily="34" charset="0"/>
+                <a:cs typeface="Arial" panose="020B0604020202020204" pitchFamily="34" charset="0"/>
+              </a:rPr>
+              <a:t>Aan begonnen</a:t>
+            </a:r>
+          </a:p>
+          <a:p>
+            <a:pPr marL="0" indent="0">
+              <a:buNone/>
+            </a:pPr>
+            <a:r>
+              <a:rPr lang="nl-NL" sz="1700" dirty="0">
+                <a:effectLst/>
+                <a:latin typeface="Aptos" panose="020B0004020202020204" pitchFamily="34" charset="0"/>
+                <a:ea typeface="Aptos" panose="020B0004020202020204" pitchFamily="34" charset="0"/>
+                <a:cs typeface="Arial" panose="020B0604020202020204" pitchFamily="34" charset="0"/>
+              </a:rPr>
+              <a:t>Als bankeigenaar wil ik dat de pinautomaat in een algemene omgeving bruikbaar is, zodat deze op elke plek, die ik wil, ingezet kan worden.</a:t>
+            </a:r>
+            <a:endParaRPr lang="nl-NL" sz="1700" dirty="0">
+              <a:solidFill>
+                <a:schemeClr val="tx1"/>
+              </a:solidFill>
+              <a:latin typeface="Aptos" panose="020B0004020202020204" pitchFamily="34" charset="0"/>
+              <a:ea typeface="Aptos" panose="020B0004020202020204" pitchFamily="34" charset="0"/>
+              <a:cs typeface="Arial" panose="020B0604020202020204" pitchFamily="34" charset="0"/>
+            </a:endParaRPr>
+          </a:p>
+          <a:p>
+            <a:pPr marL="0" indent="0">
+              <a:buNone/>
+            </a:pPr>
+            <a:r>
+              <a:rPr lang="nl-NL" sz="1700" dirty="0">
+                <a:solidFill>
+                  <a:schemeClr val="tx1"/>
+                </a:solidFill>
+                <a:effectLst/>
+                <a:latin typeface="Aptos" panose="020B0004020202020204" pitchFamily="34" charset="0"/>
+                <a:ea typeface="Aptos" panose="020B0004020202020204" pitchFamily="34" charset="0"/>
+                <a:cs typeface="Arial" panose="020B0604020202020204" pitchFamily="34" charset="0"/>
+              </a:rPr>
+              <a:t>Taken:</a:t>
+            </a:r>
+          </a:p>
+          <a:p>
+            <a:pPr marL="0" indent="0">
+              <a:buNone/>
+            </a:pPr>
+            <a:r>
+              <a:rPr lang="nl-NL" sz="1700" dirty="0">
+                <a:effectLst/>
+                <a:latin typeface="Aptos" panose="020B0004020202020204" pitchFamily="34" charset="0"/>
+                <a:ea typeface="Aptos" panose="020B0004020202020204" pitchFamily="34" charset="0"/>
+                <a:cs typeface="Arial" panose="020B0604020202020204" pitchFamily="34" charset="0"/>
+              </a:rPr>
+              <a:t>3.2 Het prototype realiseren.</a:t>
+            </a:r>
+          </a:p>
+          <a:p>
+            <a:pPr marL="0" indent="0">
+              <a:buNone/>
+            </a:pPr>
+            <a:endParaRPr lang="nl-NL" sz="1700" dirty="0">
+              <a:solidFill>
+                <a:schemeClr val="tx1"/>
+              </a:solidFill>
+              <a:latin typeface="Aptos" panose="020B0004020202020204" pitchFamily="34" charset="0"/>
+              <a:ea typeface="Aptos" panose="020B0004020202020204" pitchFamily="34" charset="0"/>
+              <a:cs typeface="Arial" panose="020B0604020202020204" pitchFamily="34" charset="0"/>
+            </a:endParaRPr>
+          </a:p>
+        </p:txBody>
+      </p:sp>
+      <p:pic>
+        <p:nvPicPr>
+          <p:cNvPr id="4" name="Picture 3">
+            <a:extLst>
+              <a:ext uri="{FF2B5EF4-FFF2-40B4-BE49-F238E27FC236}">
+                <a16:creationId xmlns:a16="http://schemas.microsoft.com/office/drawing/2014/main" id="{06971B8E-B9E9-68E3-2BF4-9CA82B1AD685}"/>
+              </a:ext>
+            </a:extLst>
+          </p:cNvPr>
+          <p:cNvPicPr>
+            <a:picLocks noChangeAspect="1"/>
+          </p:cNvPicPr>
+          <p:nvPr/>
+        </p:nvPicPr>
+        <p:blipFill>
+          <a:blip r:embed="rId3"/>
+          <a:stretch>
+            <a:fillRect/>
+          </a:stretch>
+        </p:blipFill>
+        <p:spPr>
+          <a:xfrm>
+            <a:off x="6785782" y="1938867"/>
+            <a:ext cx="4704013" cy="4375679"/>
+          </a:xfrm>
+          <a:prstGeom prst="rect">
+            <a:avLst/>
+          </a:prstGeom>
+        </p:spPr>
+      </p:pic>
+    </p:spTree>
+    <p:extLst>
+      <p:ext uri="{BB962C8B-B14F-4D97-AF65-F5344CB8AC3E}">
+        <p14:creationId xmlns:p14="http://schemas.microsoft.com/office/powerpoint/2010/main" val="664113234"/>
+      </p:ext>
+    </p:extLst>
+  </p:cSld>
+  <p:clrMapOvr>
+    <a:masterClrMapping/>
+  </p:clrMapOvr>
+</p:sld>
+</file>
+
+<file path=ppt/slides/slide8.xml><?xml version="1.0" encoding="utf-8"?>
+<p:sld xmlns:a="http://schemas.openxmlformats.org/drawingml/2006/main" xmlns:r="http://schemas.openxmlformats.org/officeDocument/2006/relationships" xmlns:p="http://schemas.openxmlformats.org/presentationml/2006/main">
+  <p:cSld>
+    <p:spTree>
+      <p:nvGrpSpPr>
+        <p:cNvPr id="1" name=""/>
+        <p:cNvGrpSpPr/>
+        <p:nvPr/>
+      </p:nvGrpSpPr>
+      <p:grpSpPr>
+        <a:xfrm>
+          <a:off x="0" y="0"/>
+          <a:ext cx="0" cy="0"/>
+          <a:chOff x="0" y="0"/>
+          <a:chExt cx="0" cy="0"/>
+        </a:xfrm>
+      </p:grpSpPr>
+      <p:sp>
+        <p:nvSpPr>
+          <p:cNvPr id="2" name="Titel 1">
+            <a:extLst>
+              <a:ext uri="{FF2B5EF4-FFF2-40B4-BE49-F238E27FC236}">
+                <a16:creationId xmlns:a16="http://schemas.microsoft.com/office/drawing/2014/main" id="{C02C5318-1A1E-49D0-B2E2-A4B0FA9E8A40}"/>
+              </a:ext>
+            </a:extLst>
+          </p:cNvPr>
+          <p:cNvSpPr>
+            <a:spLocks noGrp="1"/>
+          </p:cNvSpPr>
+          <p:nvPr>
+            <p:ph type="title"/>
+          </p:nvPr>
+        </p:nvSpPr>
+        <p:spPr>
+          <a:xfrm>
+            <a:off x="581193" y="729658"/>
+            <a:ext cx="11029616" cy="988332"/>
+          </a:xfrm>
+        </p:spPr>
+        <p:txBody>
+          <a:bodyPr rtlCol="0" anchor="b">
+            <a:normAutofit/>
+          </a:bodyPr>
+          <a:lstStyle/>
+          <a:p>
+            <a:pPr rtl="0"/>
+            <a:r>
+              <a:rPr lang="nl-NL" dirty="0"/>
+              <a:t>retrospectieve</a:t>
+            </a:r>
+          </a:p>
+        </p:txBody>
+      </p:sp>
+      <p:sp>
+        <p:nvSpPr>
+          <p:cNvPr id="3" name="Subtitel 2">
+            <a:extLst>
+              <a:ext uri="{FF2B5EF4-FFF2-40B4-BE49-F238E27FC236}">
+                <a16:creationId xmlns:a16="http://schemas.microsoft.com/office/drawing/2014/main" id="{48B6CF59-4E5B-494D-A2F7-97ADD01E6497}"/>
+              </a:ext>
+            </a:extLst>
+          </p:cNvPr>
+          <p:cNvSpPr>
+            <a:spLocks noGrp="1"/>
+          </p:cNvSpPr>
+          <p:nvPr>
+            <p:ph sz="half" idx="1"/>
+          </p:nvPr>
+        </p:nvSpPr>
+        <p:spPr>
+          <a:xfrm>
+            <a:off x="581193" y="2228003"/>
+            <a:ext cx="5422390" cy="3633047"/>
+          </a:xfrm>
+        </p:spPr>
+        <p:txBody>
+          <a:bodyPr rtlCol="0" anchor="ctr">
+            <a:normAutofit/>
+          </a:bodyPr>
+          <a:lstStyle/>
+          <a:p>
+            <a:pPr marL="0" indent="0">
+              <a:buNone/>
+            </a:pPr>
+            <a:r>
+              <a:rPr lang="nl-NL" dirty="0"/>
+              <a:t>Samenwerking:</a:t>
+            </a:r>
+          </a:p>
+          <a:p>
+            <a:r>
+              <a:rPr lang="nl-NL" dirty="0"/>
+              <a:t>Ging goed</a:t>
+            </a:r>
+          </a:p>
+          <a:p>
+            <a:r>
+              <a:rPr lang="nl-NL" dirty="0"/>
+              <a:t>Taken wisseling</a:t>
+            </a:r>
+          </a:p>
+          <a:p>
+            <a:pPr marL="0" indent="0">
+              <a:buNone/>
+            </a:pPr>
+            <a:endParaRPr lang="nl-NL" dirty="0"/>
+          </a:p>
+          <a:p>
+            <a:pPr marL="0" indent="0">
+              <a:buNone/>
+            </a:pPr>
+            <a:r>
+              <a:rPr lang="nl-NL" dirty="0"/>
+              <a:t>Project werk:</a:t>
+            </a:r>
+          </a:p>
+          <a:p>
+            <a:r>
+              <a:rPr lang="nl-NL" dirty="0"/>
+              <a:t>Werken aan project ging goed</a:t>
+            </a:r>
+          </a:p>
+          <a:p>
+            <a:r>
+              <a:rPr lang="nl-NL" dirty="0"/>
+              <a:t>Stress vanwege aankomende deadline</a:t>
+            </a:r>
+          </a:p>
+        </p:txBody>
+      </p:sp>
+      <p:pic>
+        <p:nvPicPr>
+          <p:cNvPr id="7" name="Afbeelding 6" descr="Digitale verbindingen">
+            <a:extLst>
+              <a:ext uri="{FF2B5EF4-FFF2-40B4-BE49-F238E27FC236}">
+                <a16:creationId xmlns:a16="http://schemas.microsoft.com/office/drawing/2014/main" id="{3840F91C-EDD0-4D4E-A4AB-E6C77856C88C}"/>
+              </a:ext>
+            </a:extLst>
+          </p:cNvPr>
+          <p:cNvPicPr>
+            <a:picLocks noChangeAspect="1"/>
+          </p:cNvPicPr>
+          <p:nvPr/>
+        </p:nvPicPr>
+        <p:blipFill rotWithShape="1">
+          <a:blip r:embed="rId3" cstate="screen">
+            <a:extLst>
+              <a:ext uri="{28A0092B-C50C-407E-A947-70E740481C1C}">
+                <a14:useLocalDpi xmlns:a14="http://schemas.microsoft.com/office/drawing/2010/main"/>
+              </a:ext>
+            </a:extLst>
+          </a:blip>
+          <a:srcRect l="13265" t="9091" r="3502" b="-1"/>
+          <a:stretch/>
+        </p:blipFill>
+        <p:spPr>
+          <a:xfrm>
+            <a:off x="6188417" y="2519476"/>
+            <a:ext cx="5422392" cy="3050100"/>
+          </a:xfrm>
+          <a:prstGeom prst="rect">
+            <a:avLst/>
+          </a:prstGeom>
+          <a:noFill/>
+        </p:spPr>
+      </p:pic>
+    </p:spTree>
+    <p:extLst>
+      <p:ext uri="{BB962C8B-B14F-4D97-AF65-F5344CB8AC3E}">
         <p14:creationId xmlns:p14="http://schemas.microsoft.com/office/powerpoint/2010/main" val="2704696244"/>
       </p:ext>
     </p:extLst>
@@ -6677,7 +7468,7 @@
 </p:sld>
 </file>
 
-<file path=ppt/slides/slide7.xml><?xml version="1.0" encoding="utf-8"?>
+<file path=ppt/slides/slide9.xml><?xml version="1.0" encoding="utf-8"?>
 <p:sld xmlns:a="http://schemas.openxmlformats.org/drawingml/2006/main" xmlns:r="http://schemas.openxmlformats.org/officeDocument/2006/relationships" xmlns:p="http://schemas.openxmlformats.org/presentationml/2006/main">
   <p:cSld>
     <p:spTree>

</xml_diff>